<commit_message>
updated through language section
</commit_message>
<xml_diff>
--- a/specification/imgsrc/2.pptx
+++ b/specification/imgsrc/2.pptx
@@ -104,6 +104,22 @@
       </a:defRPr>
     </a:lvl9pPr>
   </p:defaultTextStyle>
+  <p:extLst>
+    <p:ext uri="{EFAFB233-063F-42B5-8137-9DF3F51BA10A}">
+      <p15:sldGuideLst xmlns:p15="http://schemas.microsoft.com/office/powerpoint/2012/main">
+        <p15:guide id="1" orient="horz" pos="2160">
+          <p15:clr>
+            <a:srgbClr val="A4A3A4"/>
+          </p15:clr>
+        </p15:guide>
+        <p15:guide id="2" pos="2880">
+          <p15:clr>
+            <a:srgbClr val="A4A3A4"/>
+          </p15:clr>
+        </p15:guide>
+      </p15:sldGuideLst>
+    </p:ext>
+  </p:extLst>
 </p:presentation>
 </file>
 
@@ -288,7 +304,7 @@
           <a:p>
             <a:fld id="{92C380AD-82B3-504F-BD5E-C11DA684AEBB}" type="datetimeFigureOut">
               <a:rPr lang="en-US" smtClean="0"/>
-              <a:t>8/1/16</a:t>
+              <a:t>10/11/17</a:t>
             </a:fld>
             <a:endParaRPr lang="en-US"/>
           </a:p>
@@ -458,7 +474,7 @@
           <a:p>
             <a:fld id="{92C380AD-82B3-504F-BD5E-C11DA684AEBB}" type="datetimeFigureOut">
               <a:rPr lang="en-US" smtClean="0"/>
-              <a:t>8/1/16</a:t>
+              <a:t>10/11/17</a:t>
             </a:fld>
             <a:endParaRPr lang="en-US"/>
           </a:p>
@@ -638,7 +654,7 @@
           <a:p>
             <a:fld id="{92C380AD-82B3-504F-BD5E-C11DA684AEBB}" type="datetimeFigureOut">
               <a:rPr lang="en-US" smtClean="0"/>
-              <a:t>8/1/16</a:t>
+              <a:t>10/11/17</a:t>
             </a:fld>
             <a:endParaRPr lang="en-US"/>
           </a:p>
@@ -808,7 +824,7 @@
           <a:p>
             <a:fld id="{92C380AD-82B3-504F-BD5E-C11DA684AEBB}" type="datetimeFigureOut">
               <a:rPr lang="en-US" smtClean="0"/>
-              <a:t>8/1/16</a:t>
+              <a:t>10/11/17</a:t>
             </a:fld>
             <a:endParaRPr lang="en-US"/>
           </a:p>
@@ -1054,7 +1070,7 @@
           <a:p>
             <a:fld id="{92C380AD-82B3-504F-BD5E-C11DA684AEBB}" type="datetimeFigureOut">
               <a:rPr lang="en-US" smtClean="0"/>
-              <a:t>8/1/16</a:t>
+              <a:t>10/11/17</a:t>
             </a:fld>
             <a:endParaRPr lang="en-US"/>
           </a:p>
@@ -1342,7 +1358,7 @@
           <a:p>
             <a:fld id="{92C380AD-82B3-504F-BD5E-C11DA684AEBB}" type="datetimeFigureOut">
               <a:rPr lang="en-US" smtClean="0"/>
-              <a:t>8/1/16</a:t>
+              <a:t>10/11/17</a:t>
             </a:fld>
             <a:endParaRPr lang="en-US"/>
           </a:p>
@@ -1764,7 +1780,7 @@
           <a:p>
             <a:fld id="{92C380AD-82B3-504F-BD5E-C11DA684AEBB}" type="datetimeFigureOut">
               <a:rPr lang="en-US" smtClean="0"/>
-              <a:t>8/1/16</a:t>
+              <a:t>10/11/17</a:t>
             </a:fld>
             <a:endParaRPr lang="en-US"/>
           </a:p>
@@ -1882,7 +1898,7 @@
           <a:p>
             <a:fld id="{92C380AD-82B3-504F-BD5E-C11DA684AEBB}" type="datetimeFigureOut">
               <a:rPr lang="en-US" smtClean="0"/>
-              <a:t>8/1/16</a:t>
+              <a:t>10/11/17</a:t>
             </a:fld>
             <a:endParaRPr lang="en-US"/>
           </a:p>
@@ -1977,7 +1993,7 @@
           <a:p>
             <a:fld id="{92C380AD-82B3-504F-BD5E-C11DA684AEBB}" type="datetimeFigureOut">
               <a:rPr lang="en-US" smtClean="0"/>
-              <a:t>8/1/16</a:t>
+              <a:t>10/11/17</a:t>
             </a:fld>
             <a:endParaRPr lang="en-US"/>
           </a:p>
@@ -2254,7 +2270,7 @@
           <a:p>
             <a:fld id="{92C380AD-82B3-504F-BD5E-C11DA684AEBB}" type="datetimeFigureOut">
               <a:rPr lang="en-US" smtClean="0"/>
-              <a:t>8/1/16</a:t>
+              <a:t>10/11/17</a:t>
             </a:fld>
             <a:endParaRPr lang="en-US"/>
           </a:p>
@@ -2507,7 +2523,7 @@
           <a:p>
             <a:fld id="{92C380AD-82B3-504F-BD5E-C11DA684AEBB}" type="datetimeFigureOut">
               <a:rPr lang="en-US" smtClean="0"/>
-              <a:t>8/1/16</a:t>
+              <a:t>10/11/17</a:t>
             </a:fld>
             <a:endParaRPr lang="en-US"/>
           </a:p>
@@ -2720,7 +2736,7 @@
           <a:p>
             <a:fld id="{92C380AD-82B3-504F-BD5E-C11DA684AEBB}" type="datetimeFigureOut">
               <a:rPr lang="en-US" smtClean="0"/>
-              <a:t>8/1/16</a:t>
+              <a:t>10/11/17</a:t>
             </a:fld>
             <a:endParaRPr lang="en-US"/>
           </a:p>
@@ -3791,9 +3807,9 @@
           <p:nvPr/>
         </p:nvSpPr>
         <p:spPr>
-          <a:xfrm>
-            <a:off x="2265185" y="3898652"/>
-            <a:ext cx="1800133" cy="424498"/>
+          <a:xfrm rot="2700000">
+            <a:off x="2919548" y="3823346"/>
+            <a:ext cx="420624" cy="424498"/>
           </a:xfrm>
           <a:prstGeom prst="rect">
             <a:avLst/>
@@ -3868,9 +3884,9 @@
           <p:nvPr/>
         </p:nvSpPr>
         <p:spPr>
-          <a:xfrm>
-            <a:off x="4155103" y="3898652"/>
-            <a:ext cx="476819" cy="424498"/>
+          <a:xfrm rot="2700000">
+            <a:off x="3886055" y="3823346"/>
+            <a:ext cx="420624" cy="424498"/>
           </a:xfrm>
           <a:prstGeom prst="rect">
             <a:avLst/>
@@ -3918,9 +3934,9 @@
           <p:nvPr/>
         </p:nvSpPr>
         <p:spPr>
-          <a:xfrm>
-            <a:off x="1368970" y="3898652"/>
-            <a:ext cx="825957" cy="424498"/>
+          <a:xfrm rot="2700000">
+            <a:off x="1953042" y="3823346"/>
+            <a:ext cx="420624" cy="424498"/>
           </a:xfrm>
           <a:prstGeom prst="rect">
             <a:avLst/>
@@ -3967,9 +3983,9 @@
           <p:nvPr/>
         </p:nvSpPr>
         <p:spPr>
-          <a:xfrm>
-            <a:off x="746323" y="3898652"/>
-            <a:ext cx="547942" cy="424498"/>
+          <a:xfrm rot="2700000">
+            <a:off x="986536" y="3823346"/>
+            <a:ext cx="420624" cy="424498"/>
           </a:xfrm>
           <a:prstGeom prst="rect">
             <a:avLst/>
@@ -4005,7 +4021,7 @@
           <a:lstStyle/>
           <a:p>
             <a:pPr algn="ctr"/>
-            <a:endParaRPr lang="en-US"/>
+            <a:endParaRPr lang="en-US" dirty="0"/>
           </a:p>
         </p:txBody>
       </p:sp>
@@ -4045,6 +4061,126 @@
           </a:fontRef>
         </p:style>
       </p:cxnSp>
+      <p:sp>
+        <p:nvSpPr>
+          <p:cNvPr id="2" name="TextBox 1"/>
+          <p:cNvSpPr txBox="1"/>
+          <p:nvPr/>
+        </p:nvSpPr>
+        <p:spPr>
+          <a:xfrm>
+            <a:off x="1029298" y="3790323"/>
+            <a:ext cx="327334" cy="461665"/>
+          </a:xfrm>
+          <a:prstGeom prst="rect">
+            <a:avLst/>
+          </a:prstGeom>
+          <a:noFill/>
+        </p:spPr>
+        <p:txBody>
+          <a:bodyPr wrap="none" rtlCol="0">
+            <a:spAutoFit/>
+          </a:bodyPr>
+          <a:lstStyle/>
+          <a:p>
+            <a:r>
+              <a:rPr lang="en-US" sz="2400" b="1" dirty="0" smtClean="0"/>
+              <a:t>?</a:t>
+            </a:r>
+            <a:endParaRPr lang="en-US" sz="2400" b="1" dirty="0"/>
+          </a:p>
+        </p:txBody>
+      </p:sp>
+      <p:sp>
+        <p:nvSpPr>
+          <p:cNvPr id="22" name="TextBox 21"/>
+          <p:cNvSpPr txBox="1"/>
+          <p:nvPr/>
+        </p:nvSpPr>
+        <p:spPr>
+          <a:xfrm>
+            <a:off x="2003905" y="3790323"/>
+            <a:ext cx="327334" cy="461665"/>
+          </a:xfrm>
+          <a:prstGeom prst="rect">
+            <a:avLst/>
+          </a:prstGeom>
+          <a:noFill/>
+        </p:spPr>
+        <p:txBody>
+          <a:bodyPr wrap="none" rtlCol="0">
+            <a:spAutoFit/>
+          </a:bodyPr>
+          <a:lstStyle/>
+          <a:p>
+            <a:r>
+              <a:rPr lang="en-US" sz="2400" b="1" dirty="0" smtClean="0"/>
+              <a:t>?</a:t>
+            </a:r>
+            <a:endParaRPr lang="en-US" sz="2400" b="1" dirty="0"/>
+          </a:p>
+        </p:txBody>
+      </p:sp>
+      <p:sp>
+        <p:nvSpPr>
+          <p:cNvPr id="23" name="TextBox 22"/>
+          <p:cNvSpPr txBox="1"/>
+          <p:nvPr/>
+        </p:nvSpPr>
+        <p:spPr>
+          <a:xfrm>
+            <a:off x="2961377" y="3791800"/>
+            <a:ext cx="327334" cy="461665"/>
+          </a:xfrm>
+          <a:prstGeom prst="rect">
+            <a:avLst/>
+          </a:prstGeom>
+          <a:noFill/>
+        </p:spPr>
+        <p:txBody>
+          <a:bodyPr wrap="none" rtlCol="0">
+            <a:spAutoFit/>
+          </a:bodyPr>
+          <a:lstStyle/>
+          <a:p>
+            <a:r>
+              <a:rPr lang="en-US" sz="2400" b="1" dirty="0" smtClean="0"/>
+              <a:t>?</a:t>
+            </a:r>
+            <a:endParaRPr lang="en-US" sz="2400" b="1" dirty="0"/>
+          </a:p>
+        </p:txBody>
+      </p:sp>
+      <p:sp>
+        <p:nvSpPr>
+          <p:cNvPr id="25" name="TextBox 24"/>
+          <p:cNvSpPr txBox="1"/>
+          <p:nvPr/>
+        </p:nvSpPr>
+        <p:spPr>
+          <a:xfrm>
+            <a:off x="3925226" y="3791800"/>
+            <a:ext cx="327334" cy="461665"/>
+          </a:xfrm>
+          <a:prstGeom prst="rect">
+            <a:avLst/>
+          </a:prstGeom>
+          <a:noFill/>
+        </p:spPr>
+        <p:txBody>
+          <a:bodyPr wrap="none" rtlCol="0">
+            <a:spAutoFit/>
+          </a:bodyPr>
+          <a:lstStyle/>
+          <a:p>
+            <a:r>
+              <a:rPr lang="en-US" sz="2400" b="1" dirty="0" smtClean="0"/>
+              <a:t>?</a:t>
+            </a:r>
+            <a:endParaRPr lang="en-US" sz="2400" b="1" dirty="0"/>
+          </a:p>
+        </p:txBody>
+      </p:sp>
     </p:spTree>
     <p:extLst>
       <p:ext uri="{BB962C8B-B14F-4D97-AF65-F5344CB8AC3E}">

</xml_diff>

<commit_message>
incorporate John Sexton's comments
</commit_message>
<xml_diff>
--- a/specification/imgsrc/2.pptx
+++ b/specification/imgsrc/2.pptx
@@ -304,7 +304,7 @@
           <a:p>
             <a:fld id="{92C380AD-82B3-504F-BD5E-C11DA684AEBB}" type="datetimeFigureOut">
               <a:rPr lang="en-US" smtClean="0"/>
-              <a:t>10/11/17</a:t>
+              <a:t>11/27/17</a:t>
             </a:fld>
             <a:endParaRPr lang="en-US"/>
           </a:p>
@@ -474,7 +474,7 @@
           <a:p>
             <a:fld id="{92C380AD-82B3-504F-BD5E-C11DA684AEBB}" type="datetimeFigureOut">
               <a:rPr lang="en-US" smtClean="0"/>
-              <a:t>10/11/17</a:t>
+              <a:t>11/27/17</a:t>
             </a:fld>
             <a:endParaRPr lang="en-US"/>
           </a:p>
@@ -654,7 +654,7 @@
           <a:p>
             <a:fld id="{92C380AD-82B3-504F-BD5E-C11DA684AEBB}" type="datetimeFigureOut">
               <a:rPr lang="en-US" smtClean="0"/>
-              <a:t>10/11/17</a:t>
+              <a:t>11/27/17</a:t>
             </a:fld>
             <a:endParaRPr lang="en-US"/>
           </a:p>
@@ -824,7 +824,7 @@
           <a:p>
             <a:fld id="{92C380AD-82B3-504F-BD5E-C11DA684AEBB}" type="datetimeFigureOut">
               <a:rPr lang="en-US" smtClean="0"/>
-              <a:t>10/11/17</a:t>
+              <a:t>11/27/17</a:t>
             </a:fld>
             <a:endParaRPr lang="en-US"/>
           </a:p>
@@ -1070,7 +1070,7 @@
           <a:p>
             <a:fld id="{92C380AD-82B3-504F-BD5E-C11DA684AEBB}" type="datetimeFigureOut">
               <a:rPr lang="en-US" smtClean="0"/>
-              <a:t>10/11/17</a:t>
+              <a:t>11/27/17</a:t>
             </a:fld>
             <a:endParaRPr lang="en-US"/>
           </a:p>
@@ -1358,7 +1358,7 @@
           <a:p>
             <a:fld id="{92C380AD-82B3-504F-BD5E-C11DA684AEBB}" type="datetimeFigureOut">
               <a:rPr lang="en-US" smtClean="0"/>
-              <a:t>10/11/17</a:t>
+              <a:t>11/27/17</a:t>
             </a:fld>
             <a:endParaRPr lang="en-US"/>
           </a:p>
@@ -1780,7 +1780,7 @@
           <a:p>
             <a:fld id="{92C380AD-82B3-504F-BD5E-C11DA684AEBB}" type="datetimeFigureOut">
               <a:rPr lang="en-US" smtClean="0"/>
-              <a:t>10/11/17</a:t>
+              <a:t>11/27/17</a:t>
             </a:fld>
             <a:endParaRPr lang="en-US"/>
           </a:p>
@@ -1898,7 +1898,7 @@
           <a:p>
             <a:fld id="{92C380AD-82B3-504F-BD5E-C11DA684AEBB}" type="datetimeFigureOut">
               <a:rPr lang="en-US" smtClean="0"/>
-              <a:t>10/11/17</a:t>
+              <a:t>11/27/17</a:t>
             </a:fld>
             <a:endParaRPr lang="en-US"/>
           </a:p>
@@ -1993,7 +1993,7 @@
           <a:p>
             <a:fld id="{92C380AD-82B3-504F-BD5E-C11DA684AEBB}" type="datetimeFigureOut">
               <a:rPr lang="en-US" smtClean="0"/>
-              <a:t>10/11/17</a:t>
+              <a:t>11/27/17</a:t>
             </a:fld>
             <a:endParaRPr lang="en-US"/>
           </a:p>
@@ -2270,7 +2270,7 @@
           <a:p>
             <a:fld id="{92C380AD-82B3-504F-BD5E-C11DA684AEBB}" type="datetimeFigureOut">
               <a:rPr lang="en-US" smtClean="0"/>
-              <a:t>10/11/17</a:t>
+              <a:t>11/27/17</a:t>
             </a:fld>
             <a:endParaRPr lang="en-US"/>
           </a:p>
@@ -2523,7 +2523,7 @@
           <a:p>
             <a:fld id="{92C380AD-82B3-504F-BD5E-C11DA684AEBB}" type="datetimeFigureOut">
               <a:rPr lang="en-US" smtClean="0"/>
-              <a:t>10/11/17</a:t>
+              <a:t>11/27/17</a:t>
             </a:fld>
             <a:endParaRPr lang="en-US"/>
           </a:p>
@@ -2736,7 +2736,7 @@
           <a:p>
             <a:fld id="{92C380AD-82B3-504F-BD5E-C11DA684AEBB}" type="datetimeFigureOut">
               <a:rPr lang="en-US" smtClean="0"/>
-              <a:t>10/11/17</a:t>
+              <a:t>11/27/17</a:t>
             </a:fld>
             <a:endParaRPr lang="en-US"/>
           </a:p>
@@ -3111,36 +3111,6 @@
           <a:chExt cx="0" cy="0"/>
         </a:xfrm>
       </p:grpSpPr>
-      <p:pic>
-        <p:nvPicPr>
-          <p:cNvPr id="4" name="Picture 3" descr="1a-singlestrand.pdf"/>
-          <p:cNvPicPr>
-            <a:picLocks noChangeAspect="1"/>
-          </p:cNvPicPr>
-          <p:nvPr/>
-        </p:nvPicPr>
-        <p:blipFill>
-          <a:blip r:embed="rId2">
-            <a:extLst>
-              <a:ext uri="{28A0092B-C50C-407E-A947-70E740481C1C}">
-                <a14:useLocalDpi xmlns:a14="http://schemas.microsoft.com/office/drawing/2010/main" val="0"/>
-              </a:ext>
-            </a:extLst>
-          </a:blip>
-          <a:stretch>
-            <a:fillRect/>
-          </a:stretch>
-        </p:blipFill>
-        <p:spPr>
-          <a:xfrm>
-            <a:off x="627788" y="1787147"/>
-            <a:ext cx="4140200" cy="546100"/>
-          </a:xfrm>
-          <a:prstGeom prst="rect">
-            <a:avLst/>
-          </a:prstGeom>
-        </p:spPr>
-      </p:pic>
       <p:sp>
         <p:nvSpPr>
           <p:cNvPr id="24" name="TextBox 23"/>
@@ -3171,66 +3141,6 @@
           </a:p>
         </p:txBody>
       </p:sp>
-      <p:pic>
-        <p:nvPicPr>
-          <p:cNvPr id="7" name="Picture 6" descr="1a-singlestrand.pdf"/>
-          <p:cNvPicPr>
-            <a:picLocks noChangeAspect="1"/>
-          </p:cNvPicPr>
-          <p:nvPr/>
-        </p:nvPicPr>
-        <p:blipFill>
-          <a:blip r:embed="rId2">
-            <a:extLst>
-              <a:ext uri="{28A0092B-C50C-407E-A947-70E740481C1C}">
-                <a14:useLocalDpi xmlns:a14="http://schemas.microsoft.com/office/drawing/2010/main" val="0"/>
-              </a:ext>
-            </a:extLst>
-          </a:blip>
-          <a:stretch>
-            <a:fillRect/>
-          </a:stretch>
-        </p:blipFill>
-        <p:spPr>
-          <a:xfrm>
-            <a:off x="627788" y="2876550"/>
-            <a:ext cx="4140200" cy="546100"/>
-          </a:xfrm>
-          <a:prstGeom prst="rect">
-            <a:avLst/>
-          </a:prstGeom>
-        </p:spPr>
-      </p:pic>
-      <p:pic>
-        <p:nvPicPr>
-          <p:cNvPr id="8" name="Picture 7" descr="1a-singlestrand.pdf"/>
-          <p:cNvPicPr>
-            <a:picLocks noChangeAspect="1"/>
-          </p:cNvPicPr>
-          <p:nvPr/>
-        </p:nvPicPr>
-        <p:blipFill>
-          <a:blip r:embed="rId2">
-            <a:extLst>
-              <a:ext uri="{28A0092B-C50C-407E-A947-70E740481C1C}">
-                <a14:useLocalDpi xmlns:a14="http://schemas.microsoft.com/office/drawing/2010/main" val="0"/>
-              </a:ext>
-            </a:extLst>
-          </a:blip>
-          <a:stretch>
-            <a:fillRect/>
-          </a:stretch>
-        </p:blipFill>
-        <p:spPr>
-          <a:xfrm>
-            <a:off x="627788" y="4870421"/>
-            <a:ext cx="4140200" cy="546100"/>
-          </a:xfrm>
-          <a:prstGeom prst="rect">
-            <a:avLst/>
-          </a:prstGeom>
-        </p:spPr>
-      </p:pic>
       <p:sp>
         <p:nvSpPr>
           <p:cNvPr id="9" name="TextBox 8"/>
@@ -3323,14 +3233,14 @@
       </p:sp>
       <p:sp>
         <p:nvSpPr>
-          <p:cNvPr id="5" name="Rectangle 4"/>
+          <p:cNvPr id="13" name="Rectangle 12"/>
           <p:cNvSpPr/>
           <p:nvPr/>
         </p:nvSpPr>
         <p:spPr>
           <a:xfrm>
-            <a:off x="2252734" y="2881492"/>
-            <a:ext cx="1800133" cy="479870"/>
+            <a:off x="4155103" y="4894222"/>
+            <a:ext cx="197275" cy="265758"/>
           </a:xfrm>
           <a:prstGeom prst="rect">
             <a:avLst/>
@@ -3368,14 +3278,887 @@
       </p:sp>
       <p:sp>
         <p:nvSpPr>
+          <p:cNvPr id="16" name="Rectangle 15"/>
+          <p:cNvSpPr/>
+          <p:nvPr/>
+        </p:nvSpPr>
+        <p:spPr>
+          <a:xfrm rot="2700000">
+            <a:off x="2919548" y="3823346"/>
+            <a:ext cx="420624" cy="424498"/>
+          </a:xfrm>
+          <a:prstGeom prst="rect">
+            <a:avLst/>
+          </a:prstGeom>
+          <a:solidFill>
+            <a:schemeClr val="accent2"/>
+          </a:solidFill>
+          <a:ln w="19050" cmpd="sng">
+            <a:solidFill>
+              <a:srgbClr val="000000"/>
+            </a:solidFill>
+          </a:ln>
+          <a:effectLst/>
+        </p:spPr>
+        <p:style>
+          <a:lnRef idx="1">
+            <a:schemeClr val="accent1"/>
+          </a:lnRef>
+          <a:fillRef idx="3">
+            <a:schemeClr val="accent1"/>
+          </a:fillRef>
+          <a:effectRef idx="2">
+            <a:schemeClr val="accent1"/>
+          </a:effectRef>
+          <a:fontRef idx="minor">
+            <a:schemeClr val="lt1"/>
+          </a:fontRef>
+        </p:style>
+        <p:txBody>
+          <a:bodyPr rtlCol="0" anchor="ctr"/>
+          <a:lstStyle/>
+          <a:p>
+            <a:pPr algn="ctr"/>
+            <a:endParaRPr lang="en-US"/>
+          </a:p>
+        </p:txBody>
+      </p:sp>
+      <p:sp>
+        <p:nvSpPr>
+          <p:cNvPr id="18" name="TextBox 17"/>
+          <p:cNvSpPr txBox="1"/>
+          <p:nvPr/>
+        </p:nvSpPr>
+        <p:spPr>
+          <a:xfrm>
+            <a:off x="5759875" y="3843280"/>
+            <a:ext cx="1441420" cy="369332"/>
+          </a:xfrm>
+          <a:prstGeom prst="rect">
+            <a:avLst/>
+          </a:prstGeom>
+          <a:noFill/>
+        </p:spPr>
+        <p:txBody>
+          <a:bodyPr wrap="none" rtlCol="0">
+            <a:spAutoFit/>
+          </a:bodyPr>
+          <a:lstStyle/>
+          <a:p>
+            <a:r>
+              <a:rPr lang="en-US" dirty="0" smtClean="0"/>
+              <a:t>SHOULD NOT</a:t>
+            </a:r>
+            <a:endParaRPr lang="en-US" dirty="0"/>
+          </a:p>
+        </p:txBody>
+      </p:sp>
+      <p:sp>
+        <p:nvSpPr>
+          <p:cNvPr id="19" name="Rectangle 18"/>
+          <p:cNvSpPr/>
+          <p:nvPr/>
+        </p:nvSpPr>
+        <p:spPr>
+          <a:xfrm rot="2700000">
+            <a:off x="3886055" y="3823346"/>
+            <a:ext cx="420624" cy="424498"/>
+          </a:xfrm>
+          <a:prstGeom prst="rect">
+            <a:avLst/>
+          </a:prstGeom>
+          <a:solidFill>
+            <a:schemeClr val="accent2">
+              <a:lumMod val="60000"/>
+              <a:lumOff val="40000"/>
+            </a:schemeClr>
+          </a:solidFill>
+          <a:ln w="19050" cmpd="sng">
+            <a:solidFill>
+              <a:srgbClr val="000000"/>
+            </a:solidFill>
+          </a:ln>
+          <a:effectLst/>
+        </p:spPr>
+        <p:style>
+          <a:lnRef idx="1">
+            <a:schemeClr val="accent1"/>
+          </a:lnRef>
+          <a:fillRef idx="3">
+            <a:schemeClr val="accent1"/>
+          </a:fillRef>
+          <a:effectRef idx="2">
+            <a:schemeClr val="accent1"/>
+          </a:effectRef>
+          <a:fontRef idx="minor">
+            <a:schemeClr val="lt1"/>
+          </a:fontRef>
+        </p:style>
+        <p:txBody>
+          <a:bodyPr rtlCol="0" anchor="ctr"/>
+          <a:lstStyle/>
+          <a:p>
+            <a:pPr algn="ctr"/>
+            <a:endParaRPr lang="en-US"/>
+          </a:p>
+        </p:txBody>
+      </p:sp>
+      <p:sp>
+        <p:nvSpPr>
+          <p:cNvPr id="20" name="Rectangle 19"/>
+          <p:cNvSpPr/>
+          <p:nvPr/>
+        </p:nvSpPr>
+        <p:spPr>
+          <a:xfrm rot="2700000">
+            <a:off x="1953042" y="3823346"/>
+            <a:ext cx="420624" cy="424498"/>
+          </a:xfrm>
+          <a:prstGeom prst="rect">
+            <a:avLst/>
+          </a:prstGeom>
+          <a:solidFill>
+            <a:schemeClr val="accent5">
+              <a:lumMod val="75000"/>
+            </a:schemeClr>
+          </a:solidFill>
+          <a:ln w="19050" cmpd="sng">
+            <a:solidFill>
+              <a:srgbClr val="000000"/>
+            </a:solidFill>
+          </a:ln>
+          <a:effectLst/>
+        </p:spPr>
+        <p:style>
+          <a:lnRef idx="1">
+            <a:schemeClr val="accent1"/>
+          </a:lnRef>
+          <a:fillRef idx="3">
+            <a:schemeClr val="accent1"/>
+          </a:fillRef>
+          <a:effectRef idx="2">
+            <a:schemeClr val="accent1"/>
+          </a:effectRef>
+          <a:fontRef idx="minor">
+            <a:schemeClr val="lt1"/>
+          </a:fontRef>
+        </p:style>
+        <p:txBody>
+          <a:bodyPr rtlCol="0" anchor="ctr"/>
+          <a:lstStyle/>
+          <a:p>
+            <a:pPr algn="ctr"/>
+            <a:endParaRPr lang="en-US"/>
+          </a:p>
+        </p:txBody>
+      </p:sp>
+      <p:sp>
+        <p:nvSpPr>
+          <p:cNvPr id="21" name="Rectangle 20"/>
+          <p:cNvSpPr/>
+          <p:nvPr/>
+        </p:nvSpPr>
+        <p:spPr>
+          <a:xfrm rot="2700000">
+            <a:off x="986536" y="3823346"/>
+            <a:ext cx="420624" cy="424498"/>
+          </a:xfrm>
+          <a:prstGeom prst="rect">
+            <a:avLst/>
+          </a:prstGeom>
+          <a:solidFill>
+            <a:schemeClr val="bg1">
+              <a:lumMod val="50000"/>
+            </a:schemeClr>
+          </a:solidFill>
+          <a:ln w="19050" cmpd="sng">
+            <a:solidFill>
+              <a:srgbClr val="000000"/>
+            </a:solidFill>
+          </a:ln>
+          <a:effectLst/>
+        </p:spPr>
+        <p:style>
+          <a:lnRef idx="1">
+            <a:schemeClr val="accent1"/>
+          </a:lnRef>
+          <a:fillRef idx="3">
+            <a:schemeClr val="accent1"/>
+          </a:fillRef>
+          <a:effectRef idx="2">
+            <a:schemeClr val="accent1"/>
+          </a:effectRef>
+          <a:fontRef idx="minor">
+            <a:schemeClr val="lt1"/>
+          </a:fontRef>
+        </p:style>
+        <p:txBody>
+          <a:bodyPr rtlCol="0" anchor="ctr"/>
+          <a:lstStyle/>
+          <a:p>
+            <a:pPr algn="ctr"/>
+            <a:endParaRPr lang="en-US" dirty="0"/>
+          </a:p>
+        </p:txBody>
+      </p:sp>
+      <p:cxnSp>
+        <p:nvCxnSpPr>
+          <p:cNvPr id="3" name="Straight Connector 2"/>
+          <p:cNvCxnSpPr/>
+          <p:nvPr/>
+        </p:nvCxnSpPr>
+        <p:spPr>
+          <a:xfrm>
+            <a:off x="627788" y="4323150"/>
+            <a:ext cx="4140200" cy="0"/>
+          </a:xfrm>
+          <a:prstGeom prst="line">
+            <a:avLst/>
+          </a:prstGeom>
+          <a:ln>
+            <a:solidFill>
+              <a:srgbClr val="000000"/>
+            </a:solidFill>
+          </a:ln>
+          <a:effectLst/>
+        </p:spPr>
+        <p:style>
+          <a:lnRef idx="2">
+            <a:schemeClr val="accent1"/>
+          </a:lnRef>
+          <a:fillRef idx="0">
+            <a:schemeClr val="accent1"/>
+          </a:fillRef>
+          <a:effectRef idx="1">
+            <a:schemeClr val="accent1"/>
+          </a:effectRef>
+          <a:fontRef idx="minor">
+            <a:schemeClr val="tx1"/>
+          </a:fontRef>
+        </p:style>
+      </p:cxnSp>
+      <p:sp>
+        <p:nvSpPr>
+          <p:cNvPr id="2" name="TextBox 1"/>
+          <p:cNvSpPr txBox="1"/>
+          <p:nvPr/>
+        </p:nvSpPr>
+        <p:spPr>
+          <a:xfrm>
+            <a:off x="1029298" y="3790323"/>
+            <a:ext cx="327334" cy="461665"/>
+          </a:xfrm>
+          <a:prstGeom prst="rect">
+            <a:avLst/>
+          </a:prstGeom>
+          <a:noFill/>
+        </p:spPr>
+        <p:txBody>
+          <a:bodyPr wrap="none" rtlCol="0">
+            <a:spAutoFit/>
+          </a:bodyPr>
+          <a:lstStyle/>
+          <a:p>
+            <a:r>
+              <a:rPr lang="en-US" sz="2400" b="1" dirty="0" smtClean="0"/>
+              <a:t>?</a:t>
+            </a:r>
+            <a:endParaRPr lang="en-US" sz="2400" b="1" dirty="0"/>
+          </a:p>
+        </p:txBody>
+      </p:sp>
+      <p:sp>
+        <p:nvSpPr>
+          <p:cNvPr id="22" name="TextBox 21"/>
+          <p:cNvSpPr txBox="1"/>
+          <p:nvPr/>
+        </p:nvSpPr>
+        <p:spPr>
+          <a:xfrm>
+            <a:off x="2003905" y="3790323"/>
+            <a:ext cx="327334" cy="461665"/>
+          </a:xfrm>
+          <a:prstGeom prst="rect">
+            <a:avLst/>
+          </a:prstGeom>
+          <a:noFill/>
+        </p:spPr>
+        <p:txBody>
+          <a:bodyPr wrap="none" rtlCol="0">
+            <a:spAutoFit/>
+          </a:bodyPr>
+          <a:lstStyle/>
+          <a:p>
+            <a:r>
+              <a:rPr lang="en-US" sz="2400" b="1" dirty="0" smtClean="0"/>
+              <a:t>?</a:t>
+            </a:r>
+            <a:endParaRPr lang="en-US" sz="2400" b="1" dirty="0"/>
+          </a:p>
+        </p:txBody>
+      </p:sp>
+      <p:sp>
+        <p:nvSpPr>
+          <p:cNvPr id="23" name="TextBox 22"/>
+          <p:cNvSpPr txBox="1"/>
+          <p:nvPr/>
+        </p:nvSpPr>
+        <p:spPr>
+          <a:xfrm>
+            <a:off x="2961377" y="3791800"/>
+            <a:ext cx="327334" cy="461665"/>
+          </a:xfrm>
+          <a:prstGeom prst="rect">
+            <a:avLst/>
+          </a:prstGeom>
+          <a:noFill/>
+        </p:spPr>
+        <p:txBody>
+          <a:bodyPr wrap="none" rtlCol="0">
+            <a:spAutoFit/>
+          </a:bodyPr>
+          <a:lstStyle/>
+          <a:p>
+            <a:r>
+              <a:rPr lang="en-US" sz="2400" b="1" dirty="0" smtClean="0"/>
+              <a:t>?</a:t>
+            </a:r>
+            <a:endParaRPr lang="en-US" sz="2400" b="1" dirty="0"/>
+          </a:p>
+        </p:txBody>
+      </p:sp>
+      <p:sp>
+        <p:nvSpPr>
+          <p:cNvPr id="25" name="TextBox 24"/>
+          <p:cNvSpPr txBox="1"/>
+          <p:nvPr/>
+        </p:nvSpPr>
+        <p:spPr>
+          <a:xfrm>
+            <a:off x="3925226" y="3791800"/>
+            <a:ext cx="327334" cy="461665"/>
+          </a:xfrm>
+          <a:prstGeom prst="rect">
+            <a:avLst/>
+          </a:prstGeom>
+          <a:noFill/>
+        </p:spPr>
+        <p:txBody>
+          <a:bodyPr wrap="none" rtlCol="0">
+            <a:spAutoFit/>
+          </a:bodyPr>
+          <a:lstStyle/>
+          <a:p>
+            <a:r>
+              <a:rPr lang="en-US" sz="2400" b="1" dirty="0" smtClean="0"/>
+              <a:t>?</a:t>
+            </a:r>
+            <a:endParaRPr lang="en-US" sz="2400" b="1" dirty="0"/>
+          </a:p>
+        </p:txBody>
+      </p:sp>
+      <p:grpSp>
+        <p:nvGrpSpPr>
+          <p:cNvPr id="17" name="Group 16"/>
+          <p:cNvGrpSpPr/>
+          <p:nvPr/>
+        </p:nvGrpSpPr>
+        <p:grpSpPr>
+          <a:xfrm>
+            <a:off x="622250" y="1524140"/>
+            <a:ext cx="4196538" cy="1003545"/>
+            <a:chOff x="2569133" y="413397"/>
+            <a:chExt cx="4196538" cy="1003545"/>
+          </a:xfrm>
+        </p:grpSpPr>
+        <p:sp>
+          <p:nvSpPr>
+            <p:cNvPr id="26" name="Rectangle 25"/>
+            <p:cNvSpPr/>
+            <p:nvPr/>
+          </p:nvSpPr>
+          <p:spPr>
+            <a:xfrm>
+              <a:off x="2861009" y="1050856"/>
+              <a:ext cx="275302" cy="221921"/>
+            </a:xfrm>
+            <a:prstGeom prst="rect">
+              <a:avLst/>
+            </a:prstGeom>
+            <a:solidFill>
+              <a:schemeClr val="bg1"/>
+            </a:solidFill>
+            <a:ln>
+              <a:noFill/>
+            </a:ln>
+            <a:effectLst/>
+          </p:spPr>
+          <p:style>
+            <a:lnRef idx="1">
+              <a:schemeClr val="accent1"/>
+            </a:lnRef>
+            <a:fillRef idx="3">
+              <a:schemeClr val="accent1"/>
+            </a:fillRef>
+            <a:effectRef idx="2">
+              <a:schemeClr val="accent1"/>
+            </a:effectRef>
+            <a:fontRef idx="minor">
+              <a:schemeClr val="lt1"/>
+            </a:fontRef>
+          </p:style>
+          <p:txBody>
+            <a:bodyPr rtlCol="0" anchor="ctr"/>
+            <a:lstStyle/>
+            <a:p>
+              <a:pPr algn="ctr"/>
+              <a:endParaRPr lang="en-US" dirty="0"/>
+            </a:p>
+          </p:txBody>
+        </p:sp>
+        <p:cxnSp>
+          <p:nvCxnSpPr>
+            <p:cNvPr id="27" name="Straight Connector 26"/>
+            <p:cNvCxnSpPr/>
+            <p:nvPr/>
+          </p:nvCxnSpPr>
+          <p:spPr>
+            <a:xfrm>
+              <a:off x="2569133" y="1140336"/>
+              <a:ext cx="4191000" cy="0"/>
+            </a:xfrm>
+            <a:prstGeom prst="line">
+              <a:avLst/>
+            </a:prstGeom>
+            <a:ln w="38100" cap="flat" cmpd="sng" algn="ctr">
+              <a:solidFill>
+                <a:srgbClr val="000000"/>
+              </a:solidFill>
+              <a:prstDash val="solid"/>
+              <a:round/>
+              <a:headEnd type="none" w="med" len="med"/>
+              <a:tailEnd type="none" w="med" len="med"/>
+            </a:ln>
+            <a:effectLst/>
+          </p:spPr>
+          <p:style>
+            <a:lnRef idx="2">
+              <a:schemeClr val="accent1"/>
+            </a:lnRef>
+            <a:fillRef idx="0">
+              <a:schemeClr val="accent1"/>
+            </a:fillRef>
+            <a:effectRef idx="1">
+              <a:schemeClr val="accent1"/>
+            </a:effectRef>
+            <a:fontRef idx="minor">
+              <a:schemeClr val="tx1"/>
+            </a:fontRef>
+          </p:style>
+        </p:cxnSp>
+        <p:sp>
+          <p:nvSpPr>
+            <p:cNvPr id="28" name="Right Arrow 27"/>
+            <p:cNvSpPr/>
+            <p:nvPr/>
+          </p:nvSpPr>
+          <p:spPr>
+            <a:xfrm>
+              <a:off x="4740833" y="949836"/>
+              <a:ext cx="1168400" cy="350140"/>
+            </a:xfrm>
+            <a:prstGeom prst="rightArrow">
+              <a:avLst>
+                <a:gd name="adj1" fmla="val 100000"/>
+                <a:gd name="adj2" fmla="val 52194"/>
+              </a:avLst>
+            </a:prstGeom>
+            <a:solidFill>
+              <a:schemeClr val="accent2"/>
+            </a:solidFill>
+            <a:ln w="38100" cap="flat" cmpd="sng" algn="ctr">
+              <a:solidFill>
+                <a:srgbClr val="000000"/>
+              </a:solidFill>
+              <a:prstDash val="solid"/>
+              <a:round/>
+              <a:headEnd type="none" w="med" len="med"/>
+              <a:tailEnd type="none" w="med" len="med"/>
+            </a:ln>
+            <a:effectLst/>
+          </p:spPr>
+          <p:style>
+            <a:lnRef idx="1">
+              <a:schemeClr val="accent1"/>
+            </a:lnRef>
+            <a:fillRef idx="3">
+              <a:schemeClr val="accent1"/>
+            </a:fillRef>
+            <a:effectRef idx="2">
+              <a:schemeClr val="accent1"/>
+            </a:effectRef>
+            <a:fontRef idx="minor">
+              <a:schemeClr val="lt1"/>
+            </a:fontRef>
+          </p:style>
+          <p:txBody>
+            <a:bodyPr rtlCol="0" anchor="ctr"/>
+            <a:lstStyle/>
+            <a:p>
+              <a:pPr algn="ctr"/>
+              <a:endParaRPr lang="en-US" i="1" dirty="0">
+                <a:solidFill>
+                  <a:schemeClr val="tx1"/>
+                </a:solidFill>
+              </a:endParaRPr>
+            </a:p>
+          </p:txBody>
+        </p:sp>
+        <p:sp>
+          <p:nvSpPr>
+            <p:cNvPr id="29" name="Chord 28"/>
+            <p:cNvSpPr/>
+            <p:nvPr/>
+          </p:nvSpPr>
+          <p:spPr>
+            <a:xfrm>
+              <a:off x="3734347" y="784736"/>
+              <a:ext cx="632206" cy="632206"/>
+            </a:xfrm>
+            <a:prstGeom prst="chord">
+              <a:avLst>
+                <a:gd name="adj1" fmla="val 10506229"/>
+                <a:gd name="adj2" fmla="val 301460"/>
+              </a:avLst>
+            </a:prstGeom>
+            <a:solidFill>
+              <a:schemeClr val="accent4">
+                <a:lumMod val="60000"/>
+                <a:lumOff val="40000"/>
+              </a:schemeClr>
+            </a:solidFill>
+            <a:ln w="38100" cap="flat" cmpd="sng" algn="ctr">
+              <a:solidFill>
+                <a:srgbClr val="000000"/>
+              </a:solidFill>
+              <a:prstDash val="solid"/>
+              <a:round/>
+              <a:headEnd type="none" w="med" len="med"/>
+              <a:tailEnd type="none" w="med" len="med"/>
+            </a:ln>
+            <a:effectLst/>
+          </p:spPr>
+          <p:style>
+            <a:lnRef idx="1">
+              <a:schemeClr val="accent1"/>
+            </a:lnRef>
+            <a:fillRef idx="3">
+              <a:schemeClr val="accent1"/>
+            </a:fillRef>
+            <a:effectRef idx="2">
+              <a:schemeClr val="accent1"/>
+            </a:effectRef>
+            <a:fontRef idx="minor">
+              <a:schemeClr val="lt1"/>
+            </a:fontRef>
+          </p:style>
+          <p:txBody>
+            <a:bodyPr rtlCol="0" anchor="ctr"/>
+            <a:lstStyle/>
+            <a:p>
+              <a:pPr algn="ctr"/>
+              <a:endParaRPr lang="en-US"/>
+            </a:p>
+          </p:txBody>
+        </p:sp>
+        <p:pic>
+          <p:nvPicPr>
+            <p:cNvPr id="6" name="Picture 5"/>
+            <p:cNvPicPr>
+              <a:picLocks noChangeAspect="1"/>
+            </p:cNvPicPr>
+            <p:nvPr/>
+          </p:nvPicPr>
+          <p:blipFill>
+            <a:blip r:embed="rId2">
+              <a:extLst>
+                <a:ext uri="{28A0092B-C50C-407E-A947-70E740481C1C}">
+                  <a14:useLocalDpi xmlns:a14="http://schemas.microsoft.com/office/drawing/2010/main" val="0"/>
+                </a:ext>
+              </a:extLst>
+            </a:blip>
+            <a:stretch>
+              <a:fillRect/>
+            </a:stretch>
+          </p:blipFill>
+          <p:spPr>
+            <a:xfrm>
+              <a:off x="2803319" y="413397"/>
+              <a:ext cx="771908" cy="771908"/>
+            </a:xfrm>
+            <a:prstGeom prst="rect">
+              <a:avLst/>
+            </a:prstGeom>
+          </p:spPr>
+        </p:pic>
+        <p:pic>
+          <p:nvPicPr>
+            <p:cNvPr id="14" name="Picture 13"/>
+            <p:cNvPicPr>
+              <a:picLocks noChangeAspect="1"/>
+            </p:cNvPicPr>
+            <p:nvPr/>
+          </p:nvPicPr>
+          <p:blipFill>
+            <a:blip r:embed="rId3">
+              <a:extLst>
+                <a:ext uri="{28A0092B-C50C-407E-A947-70E740481C1C}">
+                  <a14:useLocalDpi xmlns:a14="http://schemas.microsoft.com/office/drawing/2010/main" val="0"/>
+                </a:ext>
+              </a:extLst>
+            </a:blip>
+            <a:stretch>
+              <a:fillRect/>
+            </a:stretch>
+          </p:blipFill>
+          <p:spPr>
+            <a:xfrm>
+              <a:off x="5971536" y="499461"/>
+              <a:ext cx="794135" cy="794135"/>
+            </a:xfrm>
+            <a:prstGeom prst="rect">
+              <a:avLst/>
+            </a:prstGeom>
+          </p:spPr>
+        </p:pic>
+      </p:grpSp>
+      <p:grpSp>
+        <p:nvGrpSpPr>
+          <p:cNvPr id="33" name="Group 32"/>
+          <p:cNvGrpSpPr/>
+          <p:nvPr/>
+        </p:nvGrpSpPr>
+        <p:grpSpPr>
+          <a:xfrm>
+            <a:off x="627788" y="2560175"/>
+            <a:ext cx="4196538" cy="1003545"/>
+            <a:chOff x="2569133" y="413397"/>
+            <a:chExt cx="4196538" cy="1003545"/>
+          </a:xfrm>
+        </p:grpSpPr>
+        <p:sp>
+          <p:nvSpPr>
+            <p:cNvPr id="34" name="Rectangle 33"/>
+            <p:cNvSpPr/>
+            <p:nvPr/>
+          </p:nvSpPr>
+          <p:spPr>
+            <a:xfrm>
+              <a:off x="2861009" y="1050856"/>
+              <a:ext cx="275302" cy="221921"/>
+            </a:xfrm>
+            <a:prstGeom prst="rect">
+              <a:avLst/>
+            </a:prstGeom>
+            <a:solidFill>
+              <a:schemeClr val="bg1"/>
+            </a:solidFill>
+            <a:ln>
+              <a:noFill/>
+            </a:ln>
+            <a:effectLst/>
+          </p:spPr>
+          <p:style>
+            <a:lnRef idx="1">
+              <a:schemeClr val="accent1"/>
+            </a:lnRef>
+            <a:fillRef idx="3">
+              <a:schemeClr val="accent1"/>
+            </a:fillRef>
+            <a:effectRef idx="2">
+              <a:schemeClr val="accent1"/>
+            </a:effectRef>
+            <a:fontRef idx="minor">
+              <a:schemeClr val="lt1"/>
+            </a:fontRef>
+          </p:style>
+          <p:txBody>
+            <a:bodyPr rtlCol="0" anchor="ctr"/>
+            <a:lstStyle/>
+            <a:p>
+              <a:pPr algn="ctr"/>
+              <a:endParaRPr lang="en-US" dirty="0"/>
+            </a:p>
+          </p:txBody>
+        </p:sp>
+        <p:cxnSp>
+          <p:nvCxnSpPr>
+            <p:cNvPr id="35" name="Straight Connector 34"/>
+            <p:cNvCxnSpPr/>
+            <p:nvPr/>
+          </p:nvCxnSpPr>
+          <p:spPr>
+            <a:xfrm>
+              <a:off x="2569133" y="1140336"/>
+              <a:ext cx="4191000" cy="0"/>
+            </a:xfrm>
+            <a:prstGeom prst="line">
+              <a:avLst/>
+            </a:prstGeom>
+            <a:ln w="38100" cap="flat" cmpd="sng" algn="ctr">
+              <a:solidFill>
+                <a:srgbClr val="000000"/>
+              </a:solidFill>
+              <a:prstDash val="solid"/>
+              <a:round/>
+              <a:headEnd type="none" w="med" len="med"/>
+              <a:tailEnd type="none" w="med" len="med"/>
+            </a:ln>
+            <a:effectLst/>
+          </p:spPr>
+          <p:style>
+            <a:lnRef idx="2">
+              <a:schemeClr val="accent1"/>
+            </a:lnRef>
+            <a:fillRef idx="0">
+              <a:schemeClr val="accent1"/>
+            </a:fillRef>
+            <a:effectRef idx="1">
+              <a:schemeClr val="accent1"/>
+            </a:effectRef>
+            <a:fontRef idx="minor">
+              <a:schemeClr val="tx1"/>
+            </a:fontRef>
+          </p:style>
+        </p:cxnSp>
+        <p:sp>
+          <p:nvSpPr>
+            <p:cNvPr id="37" name="Chord 36"/>
+            <p:cNvSpPr/>
+            <p:nvPr/>
+          </p:nvSpPr>
+          <p:spPr>
+            <a:xfrm>
+              <a:off x="3734347" y="784736"/>
+              <a:ext cx="632206" cy="632206"/>
+            </a:xfrm>
+            <a:prstGeom prst="chord">
+              <a:avLst>
+                <a:gd name="adj1" fmla="val 10506229"/>
+                <a:gd name="adj2" fmla="val 301460"/>
+              </a:avLst>
+            </a:prstGeom>
+            <a:solidFill>
+              <a:schemeClr val="accent4">
+                <a:lumMod val="60000"/>
+                <a:lumOff val="40000"/>
+              </a:schemeClr>
+            </a:solidFill>
+            <a:ln w="38100" cap="flat" cmpd="sng" algn="ctr">
+              <a:solidFill>
+                <a:srgbClr val="000000"/>
+              </a:solidFill>
+              <a:prstDash val="solid"/>
+              <a:round/>
+              <a:headEnd type="none" w="med" len="med"/>
+              <a:tailEnd type="none" w="med" len="med"/>
+            </a:ln>
+            <a:effectLst/>
+          </p:spPr>
+          <p:style>
+            <a:lnRef idx="1">
+              <a:schemeClr val="accent1"/>
+            </a:lnRef>
+            <a:fillRef idx="3">
+              <a:schemeClr val="accent1"/>
+            </a:fillRef>
+            <a:effectRef idx="2">
+              <a:schemeClr val="accent1"/>
+            </a:effectRef>
+            <a:fontRef idx="minor">
+              <a:schemeClr val="lt1"/>
+            </a:fontRef>
+          </p:style>
+          <p:txBody>
+            <a:bodyPr rtlCol="0" anchor="ctr"/>
+            <a:lstStyle/>
+            <a:p>
+              <a:pPr algn="ctr"/>
+              <a:endParaRPr lang="en-US"/>
+            </a:p>
+          </p:txBody>
+        </p:sp>
+        <p:pic>
+          <p:nvPicPr>
+            <p:cNvPr id="38" name="Picture 37"/>
+            <p:cNvPicPr>
+              <a:picLocks noChangeAspect="1"/>
+            </p:cNvPicPr>
+            <p:nvPr/>
+          </p:nvPicPr>
+          <p:blipFill>
+            <a:blip r:embed="rId2">
+              <a:extLst>
+                <a:ext uri="{28A0092B-C50C-407E-A947-70E740481C1C}">
+                  <a14:useLocalDpi xmlns:a14="http://schemas.microsoft.com/office/drawing/2010/main" val="0"/>
+                </a:ext>
+              </a:extLst>
+            </a:blip>
+            <a:stretch>
+              <a:fillRect/>
+            </a:stretch>
+          </p:blipFill>
+          <p:spPr>
+            <a:xfrm>
+              <a:off x="2803319" y="413397"/>
+              <a:ext cx="771908" cy="771908"/>
+            </a:xfrm>
+            <a:prstGeom prst="rect">
+              <a:avLst/>
+            </a:prstGeom>
+          </p:spPr>
+        </p:pic>
+        <p:pic>
+          <p:nvPicPr>
+            <p:cNvPr id="39" name="Picture 38"/>
+            <p:cNvPicPr>
+              <a:picLocks noChangeAspect="1"/>
+            </p:cNvPicPr>
+            <p:nvPr/>
+          </p:nvPicPr>
+          <p:blipFill>
+            <a:blip r:embed="rId3">
+              <a:extLst>
+                <a:ext uri="{28A0092B-C50C-407E-A947-70E740481C1C}">
+                  <a14:useLocalDpi xmlns:a14="http://schemas.microsoft.com/office/drawing/2010/main" val="0"/>
+                </a:ext>
+              </a:extLst>
+            </a:blip>
+            <a:stretch>
+              <a:fillRect/>
+            </a:stretch>
+          </p:blipFill>
+          <p:spPr>
+            <a:xfrm>
+              <a:off x="5971536" y="499461"/>
+              <a:ext cx="794135" cy="794135"/>
+            </a:xfrm>
+            <a:prstGeom prst="rect">
+              <a:avLst/>
+            </a:prstGeom>
+          </p:spPr>
+        </p:pic>
+      </p:grpSp>
+      <p:sp>
+        <p:nvSpPr>
           <p:cNvPr id="12" name="Freeform 11"/>
           <p:cNvSpPr/>
           <p:nvPr/>
         </p:nvSpPr>
         <p:spPr>
           <a:xfrm>
-            <a:off x="2170025" y="2831215"/>
-            <a:ext cx="1812463" cy="542476"/>
+            <a:off x="2541296" y="2744638"/>
+            <a:ext cx="1488593" cy="542476"/>
           </a:xfrm>
           <a:custGeom>
             <a:avLst/>
@@ -3717,470 +4500,281 @@
           </a:p>
         </p:txBody>
       </p:sp>
-      <p:sp>
-        <p:nvSpPr>
-          <p:cNvPr id="13" name="Rectangle 12"/>
-          <p:cNvSpPr/>
+      <p:grpSp>
+        <p:nvGrpSpPr>
+          <p:cNvPr id="40" name="Group 39"/>
+          <p:cNvGrpSpPr/>
           <p:nvPr/>
-        </p:nvSpPr>
+        </p:nvGrpSpPr>
+        <p:grpSpPr>
+          <a:xfrm>
+            <a:off x="627788" y="4623691"/>
+            <a:ext cx="4191000" cy="1003545"/>
+            <a:chOff x="2569133" y="413397"/>
+            <a:chExt cx="4191000" cy="1003545"/>
+          </a:xfrm>
+        </p:grpSpPr>
+        <p:sp>
+          <p:nvSpPr>
+            <p:cNvPr id="41" name="Rectangle 40"/>
+            <p:cNvSpPr/>
+            <p:nvPr/>
+          </p:nvSpPr>
+          <p:spPr>
+            <a:xfrm>
+              <a:off x="2861009" y="1050856"/>
+              <a:ext cx="275302" cy="221921"/>
+            </a:xfrm>
+            <a:prstGeom prst="rect">
+              <a:avLst/>
+            </a:prstGeom>
+            <a:solidFill>
+              <a:schemeClr val="bg1"/>
+            </a:solidFill>
+            <a:ln>
+              <a:noFill/>
+            </a:ln>
+            <a:effectLst/>
+          </p:spPr>
+          <p:style>
+            <a:lnRef idx="1">
+              <a:schemeClr val="accent1"/>
+            </a:lnRef>
+            <a:fillRef idx="3">
+              <a:schemeClr val="accent1"/>
+            </a:fillRef>
+            <a:effectRef idx="2">
+              <a:schemeClr val="accent1"/>
+            </a:effectRef>
+            <a:fontRef idx="minor">
+              <a:schemeClr val="lt1"/>
+            </a:fontRef>
+          </p:style>
+          <p:txBody>
+            <a:bodyPr rtlCol="0" anchor="ctr"/>
+            <a:lstStyle/>
+            <a:p>
+              <a:pPr algn="ctr"/>
+              <a:endParaRPr lang="en-US" dirty="0"/>
+            </a:p>
+          </p:txBody>
+        </p:sp>
+        <p:cxnSp>
+          <p:nvCxnSpPr>
+            <p:cNvPr id="42" name="Straight Connector 41"/>
+            <p:cNvCxnSpPr/>
+            <p:nvPr/>
+          </p:nvCxnSpPr>
+          <p:spPr>
+            <a:xfrm>
+              <a:off x="2569133" y="1140336"/>
+              <a:ext cx="4191000" cy="0"/>
+            </a:xfrm>
+            <a:prstGeom prst="line">
+              <a:avLst/>
+            </a:prstGeom>
+            <a:ln w="38100" cap="flat" cmpd="sng" algn="ctr">
+              <a:solidFill>
+                <a:srgbClr val="000000"/>
+              </a:solidFill>
+              <a:prstDash val="solid"/>
+              <a:round/>
+              <a:headEnd type="none" w="med" len="med"/>
+              <a:tailEnd type="none" w="med" len="med"/>
+            </a:ln>
+            <a:effectLst/>
+          </p:spPr>
+          <p:style>
+            <a:lnRef idx="2">
+              <a:schemeClr val="accent1"/>
+            </a:lnRef>
+            <a:fillRef idx="0">
+              <a:schemeClr val="accent1"/>
+            </a:fillRef>
+            <a:effectRef idx="1">
+              <a:schemeClr val="accent1"/>
+            </a:effectRef>
+            <a:fontRef idx="minor">
+              <a:schemeClr val="tx1"/>
+            </a:fontRef>
+          </p:style>
+        </p:cxnSp>
+        <p:sp>
+          <p:nvSpPr>
+            <p:cNvPr id="43" name="Right Arrow 42"/>
+            <p:cNvSpPr/>
+            <p:nvPr/>
+          </p:nvSpPr>
+          <p:spPr>
+            <a:xfrm>
+              <a:off x="4740833" y="949836"/>
+              <a:ext cx="1168400" cy="350140"/>
+            </a:xfrm>
+            <a:prstGeom prst="rightArrow">
+              <a:avLst>
+                <a:gd name="adj1" fmla="val 100000"/>
+                <a:gd name="adj2" fmla="val 52194"/>
+              </a:avLst>
+            </a:prstGeom>
+            <a:solidFill>
+              <a:schemeClr val="accent2"/>
+            </a:solidFill>
+            <a:ln w="38100" cap="flat" cmpd="sng" algn="ctr">
+              <a:solidFill>
+                <a:srgbClr val="000000"/>
+              </a:solidFill>
+              <a:prstDash val="solid"/>
+              <a:round/>
+              <a:headEnd type="none" w="med" len="med"/>
+              <a:tailEnd type="none" w="med" len="med"/>
+            </a:ln>
+            <a:effectLst/>
+          </p:spPr>
+          <p:style>
+            <a:lnRef idx="1">
+              <a:schemeClr val="accent1"/>
+            </a:lnRef>
+            <a:fillRef idx="3">
+              <a:schemeClr val="accent1"/>
+            </a:fillRef>
+            <a:effectRef idx="2">
+              <a:schemeClr val="accent1"/>
+            </a:effectRef>
+            <a:fontRef idx="minor">
+              <a:schemeClr val="lt1"/>
+            </a:fontRef>
+          </p:style>
+          <p:txBody>
+            <a:bodyPr rtlCol="0" anchor="ctr"/>
+            <a:lstStyle/>
+            <a:p>
+              <a:pPr algn="ctr"/>
+              <a:endParaRPr lang="en-US" i="1" dirty="0">
+                <a:solidFill>
+                  <a:schemeClr val="tx1"/>
+                </a:solidFill>
+              </a:endParaRPr>
+            </a:p>
+          </p:txBody>
+        </p:sp>
+        <p:sp>
+          <p:nvSpPr>
+            <p:cNvPr id="44" name="Chord 43"/>
+            <p:cNvSpPr/>
+            <p:nvPr/>
+          </p:nvSpPr>
+          <p:spPr>
+            <a:xfrm>
+              <a:off x="3734347" y="784736"/>
+              <a:ext cx="632206" cy="632206"/>
+            </a:xfrm>
+            <a:prstGeom prst="chord">
+              <a:avLst>
+                <a:gd name="adj1" fmla="val 10506229"/>
+                <a:gd name="adj2" fmla="val 301460"/>
+              </a:avLst>
+            </a:prstGeom>
+            <a:solidFill>
+              <a:schemeClr val="accent4">
+                <a:lumMod val="60000"/>
+                <a:lumOff val="40000"/>
+              </a:schemeClr>
+            </a:solidFill>
+            <a:ln w="38100" cap="flat" cmpd="sng" algn="ctr">
+              <a:solidFill>
+                <a:srgbClr val="000000"/>
+              </a:solidFill>
+              <a:prstDash val="solid"/>
+              <a:round/>
+              <a:headEnd type="none" w="med" len="med"/>
+              <a:tailEnd type="none" w="med" len="med"/>
+            </a:ln>
+            <a:effectLst/>
+          </p:spPr>
+          <p:style>
+            <a:lnRef idx="1">
+              <a:schemeClr val="accent1"/>
+            </a:lnRef>
+            <a:fillRef idx="3">
+              <a:schemeClr val="accent1"/>
+            </a:fillRef>
+            <a:effectRef idx="2">
+              <a:schemeClr val="accent1"/>
+            </a:effectRef>
+            <a:fontRef idx="minor">
+              <a:schemeClr val="lt1"/>
+            </a:fontRef>
+          </p:style>
+          <p:txBody>
+            <a:bodyPr rtlCol="0" anchor="ctr"/>
+            <a:lstStyle/>
+            <a:p>
+              <a:pPr algn="ctr"/>
+              <a:endParaRPr lang="en-US"/>
+            </a:p>
+          </p:txBody>
+        </p:sp>
+        <p:pic>
+          <p:nvPicPr>
+            <p:cNvPr id="45" name="Picture 44"/>
+            <p:cNvPicPr>
+              <a:picLocks noChangeAspect="1"/>
+            </p:cNvPicPr>
+            <p:nvPr/>
+          </p:nvPicPr>
+          <p:blipFill>
+            <a:blip r:embed="rId2">
+              <a:extLst>
+                <a:ext uri="{28A0092B-C50C-407E-A947-70E740481C1C}">
+                  <a14:useLocalDpi xmlns:a14="http://schemas.microsoft.com/office/drawing/2010/main" val="0"/>
+                </a:ext>
+              </a:extLst>
+            </a:blip>
+            <a:stretch>
+              <a:fillRect/>
+            </a:stretch>
+          </p:blipFill>
+          <p:spPr>
+            <a:xfrm>
+              <a:off x="2803319" y="413397"/>
+              <a:ext cx="771908" cy="771908"/>
+            </a:xfrm>
+            <a:prstGeom prst="rect">
+              <a:avLst/>
+            </a:prstGeom>
+          </p:spPr>
+        </p:pic>
+      </p:grpSp>
+      <p:pic>
+        <p:nvPicPr>
+          <p:cNvPr id="47" name="Picture 46"/>
+          <p:cNvPicPr>
+            <a:picLocks noChangeAspect="1"/>
+          </p:cNvPicPr>
+          <p:nvPr/>
+        </p:nvPicPr>
+        <p:blipFill>
+          <a:blip r:embed="rId2">
+            <a:extLst>
+              <a:ext uri="{28A0092B-C50C-407E-A947-70E740481C1C}">
+                <a14:useLocalDpi xmlns:a14="http://schemas.microsoft.com/office/drawing/2010/main" val="0"/>
+              </a:ext>
+            </a:extLst>
+          </a:blip>
+          <a:stretch>
+            <a:fillRect/>
+          </a:stretch>
+        </p:blipFill>
         <p:spPr>
           <a:xfrm>
-            <a:off x="4155103" y="4894222"/>
-            <a:ext cx="197275" cy="265758"/>
+            <a:off x="4064744" y="4641147"/>
+            <a:ext cx="771908" cy="771908"/>
           </a:xfrm>
           <a:prstGeom prst="rect">
             <a:avLst/>
           </a:prstGeom>
-          <a:solidFill>
-            <a:schemeClr val="bg1"/>
-          </a:solidFill>
-          <a:ln>
-            <a:noFill/>
-          </a:ln>
-          <a:effectLst/>
         </p:spPr>
-        <p:style>
-          <a:lnRef idx="1">
-            <a:schemeClr val="accent1"/>
-          </a:lnRef>
-          <a:fillRef idx="3">
-            <a:schemeClr val="accent1"/>
-          </a:fillRef>
-          <a:effectRef idx="2">
-            <a:schemeClr val="accent1"/>
-          </a:effectRef>
-          <a:fontRef idx="minor">
-            <a:schemeClr val="lt1"/>
-          </a:fontRef>
-        </p:style>
-        <p:txBody>
-          <a:bodyPr rtlCol="0" anchor="ctr"/>
-          <a:lstStyle/>
-          <a:p>
-            <a:pPr algn="ctr"/>
-            <a:endParaRPr lang="en-US"/>
-          </a:p>
-        </p:txBody>
-      </p:sp>
-      <p:cxnSp>
-        <p:nvCxnSpPr>
-          <p:cNvPr id="15" name="Straight Arrow Connector 14"/>
-          <p:cNvCxnSpPr/>
-          <p:nvPr/>
-        </p:nvCxnSpPr>
-        <p:spPr>
-          <a:xfrm>
-            <a:off x="4438686" y="4940798"/>
-            <a:ext cx="329302" cy="0"/>
-          </a:xfrm>
-          <a:prstGeom prst="straightConnector1">
-            <a:avLst/>
-          </a:prstGeom>
-          <a:ln>
-            <a:solidFill>
-              <a:schemeClr val="tx1"/>
-            </a:solidFill>
-            <a:headEnd type="none"/>
-            <a:tailEnd type="triangle" w="med" len="lg"/>
-          </a:ln>
-          <a:effectLst/>
-        </p:spPr>
-        <p:style>
-          <a:lnRef idx="2">
-            <a:schemeClr val="accent1"/>
-          </a:lnRef>
-          <a:fillRef idx="0">
-            <a:schemeClr val="accent1"/>
-          </a:fillRef>
-          <a:effectRef idx="1">
-            <a:schemeClr val="accent1"/>
-          </a:effectRef>
-          <a:fontRef idx="minor">
-            <a:schemeClr val="tx1"/>
-          </a:fontRef>
-        </p:style>
-      </p:cxnSp>
-      <p:sp>
-        <p:nvSpPr>
-          <p:cNvPr id="16" name="Rectangle 15"/>
-          <p:cNvSpPr/>
-          <p:nvPr/>
-        </p:nvSpPr>
-        <p:spPr>
-          <a:xfrm rot="2700000">
-            <a:off x="2919548" y="3823346"/>
-            <a:ext cx="420624" cy="424498"/>
-          </a:xfrm>
-          <a:prstGeom prst="rect">
-            <a:avLst/>
-          </a:prstGeom>
-          <a:solidFill>
-            <a:schemeClr val="accent2"/>
-          </a:solidFill>
-          <a:ln w="19050" cmpd="sng">
-            <a:solidFill>
-              <a:srgbClr val="000000"/>
-            </a:solidFill>
-          </a:ln>
-          <a:effectLst/>
-        </p:spPr>
-        <p:style>
-          <a:lnRef idx="1">
-            <a:schemeClr val="accent1"/>
-          </a:lnRef>
-          <a:fillRef idx="3">
-            <a:schemeClr val="accent1"/>
-          </a:fillRef>
-          <a:effectRef idx="2">
-            <a:schemeClr val="accent1"/>
-          </a:effectRef>
-          <a:fontRef idx="minor">
-            <a:schemeClr val="lt1"/>
-          </a:fontRef>
-        </p:style>
-        <p:txBody>
-          <a:bodyPr rtlCol="0" anchor="ctr"/>
-          <a:lstStyle/>
-          <a:p>
-            <a:pPr algn="ctr"/>
-            <a:endParaRPr lang="en-US"/>
-          </a:p>
-        </p:txBody>
-      </p:sp>
-      <p:sp>
-        <p:nvSpPr>
-          <p:cNvPr id="18" name="TextBox 17"/>
-          <p:cNvSpPr txBox="1"/>
-          <p:nvPr/>
-        </p:nvSpPr>
-        <p:spPr>
-          <a:xfrm>
-            <a:off x="5759875" y="3843280"/>
-            <a:ext cx="1441420" cy="369332"/>
-          </a:xfrm>
-          <a:prstGeom prst="rect">
-            <a:avLst/>
-          </a:prstGeom>
-          <a:noFill/>
-        </p:spPr>
-        <p:txBody>
-          <a:bodyPr wrap="none" rtlCol="0">
-            <a:spAutoFit/>
-          </a:bodyPr>
-          <a:lstStyle/>
-          <a:p>
-            <a:r>
-              <a:rPr lang="en-US" dirty="0" smtClean="0"/>
-              <a:t>SHOULD NOT</a:t>
-            </a:r>
-            <a:endParaRPr lang="en-US" dirty="0"/>
-          </a:p>
-        </p:txBody>
-      </p:sp>
-      <p:sp>
-        <p:nvSpPr>
-          <p:cNvPr id="19" name="Rectangle 18"/>
-          <p:cNvSpPr/>
-          <p:nvPr/>
-        </p:nvSpPr>
-        <p:spPr>
-          <a:xfrm rot="2700000">
-            <a:off x="3886055" y="3823346"/>
-            <a:ext cx="420624" cy="424498"/>
-          </a:xfrm>
-          <a:prstGeom prst="rect">
-            <a:avLst/>
-          </a:prstGeom>
-          <a:solidFill>
-            <a:schemeClr val="accent2">
-              <a:lumMod val="60000"/>
-              <a:lumOff val="40000"/>
-            </a:schemeClr>
-          </a:solidFill>
-          <a:ln w="19050" cmpd="sng">
-            <a:solidFill>
-              <a:srgbClr val="000000"/>
-            </a:solidFill>
-          </a:ln>
-          <a:effectLst/>
-        </p:spPr>
-        <p:style>
-          <a:lnRef idx="1">
-            <a:schemeClr val="accent1"/>
-          </a:lnRef>
-          <a:fillRef idx="3">
-            <a:schemeClr val="accent1"/>
-          </a:fillRef>
-          <a:effectRef idx="2">
-            <a:schemeClr val="accent1"/>
-          </a:effectRef>
-          <a:fontRef idx="minor">
-            <a:schemeClr val="lt1"/>
-          </a:fontRef>
-        </p:style>
-        <p:txBody>
-          <a:bodyPr rtlCol="0" anchor="ctr"/>
-          <a:lstStyle/>
-          <a:p>
-            <a:pPr algn="ctr"/>
-            <a:endParaRPr lang="en-US"/>
-          </a:p>
-        </p:txBody>
-      </p:sp>
-      <p:sp>
-        <p:nvSpPr>
-          <p:cNvPr id="20" name="Rectangle 19"/>
-          <p:cNvSpPr/>
-          <p:nvPr/>
-        </p:nvSpPr>
-        <p:spPr>
-          <a:xfrm rot="2700000">
-            <a:off x="1953042" y="3823346"/>
-            <a:ext cx="420624" cy="424498"/>
-          </a:xfrm>
-          <a:prstGeom prst="rect">
-            <a:avLst/>
-          </a:prstGeom>
-          <a:solidFill>
-            <a:schemeClr val="accent5">
-              <a:lumMod val="75000"/>
-            </a:schemeClr>
-          </a:solidFill>
-          <a:ln w="19050" cmpd="sng">
-            <a:solidFill>
-              <a:srgbClr val="000000"/>
-            </a:solidFill>
-          </a:ln>
-          <a:effectLst/>
-        </p:spPr>
-        <p:style>
-          <a:lnRef idx="1">
-            <a:schemeClr val="accent1"/>
-          </a:lnRef>
-          <a:fillRef idx="3">
-            <a:schemeClr val="accent1"/>
-          </a:fillRef>
-          <a:effectRef idx="2">
-            <a:schemeClr val="accent1"/>
-          </a:effectRef>
-          <a:fontRef idx="minor">
-            <a:schemeClr val="lt1"/>
-          </a:fontRef>
-        </p:style>
-        <p:txBody>
-          <a:bodyPr rtlCol="0" anchor="ctr"/>
-          <a:lstStyle/>
-          <a:p>
-            <a:pPr algn="ctr"/>
-            <a:endParaRPr lang="en-US"/>
-          </a:p>
-        </p:txBody>
-      </p:sp>
-      <p:sp>
-        <p:nvSpPr>
-          <p:cNvPr id="21" name="Rectangle 20"/>
-          <p:cNvSpPr/>
-          <p:nvPr/>
-        </p:nvSpPr>
-        <p:spPr>
-          <a:xfrm rot="2700000">
-            <a:off x="986536" y="3823346"/>
-            <a:ext cx="420624" cy="424498"/>
-          </a:xfrm>
-          <a:prstGeom prst="rect">
-            <a:avLst/>
-          </a:prstGeom>
-          <a:solidFill>
-            <a:schemeClr val="bg1">
-              <a:lumMod val="50000"/>
-            </a:schemeClr>
-          </a:solidFill>
-          <a:ln w="19050" cmpd="sng">
-            <a:solidFill>
-              <a:srgbClr val="000000"/>
-            </a:solidFill>
-          </a:ln>
-          <a:effectLst/>
-        </p:spPr>
-        <p:style>
-          <a:lnRef idx="1">
-            <a:schemeClr val="accent1"/>
-          </a:lnRef>
-          <a:fillRef idx="3">
-            <a:schemeClr val="accent1"/>
-          </a:fillRef>
-          <a:effectRef idx="2">
-            <a:schemeClr val="accent1"/>
-          </a:effectRef>
-          <a:fontRef idx="minor">
-            <a:schemeClr val="lt1"/>
-          </a:fontRef>
-        </p:style>
-        <p:txBody>
-          <a:bodyPr rtlCol="0" anchor="ctr"/>
-          <a:lstStyle/>
-          <a:p>
-            <a:pPr algn="ctr"/>
-            <a:endParaRPr lang="en-US" dirty="0"/>
-          </a:p>
-        </p:txBody>
-      </p:sp>
-      <p:cxnSp>
-        <p:nvCxnSpPr>
-          <p:cNvPr id="3" name="Straight Connector 2"/>
-          <p:cNvCxnSpPr/>
-          <p:nvPr/>
-        </p:nvCxnSpPr>
-        <p:spPr>
-          <a:xfrm>
-            <a:off x="627788" y="4323150"/>
-            <a:ext cx="4140200" cy="0"/>
-          </a:xfrm>
-          <a:prstGeom prst="line">
-            <a:avLst/>
-          </a:prstGeom>
-          <a:ln>
-            <a:solidFill>
-              <a:srgbClr val="000000"/>
-            </a:solidFill>
-          </a:ln>
-          <a:effectLst/>
-        </p:spPr>
-        <p:style>
-          <a:lnRef idx="2">
-            <a:schemeClr val="accent1"/>
-          </a:lnRef>
-          <a:fillRef idx="0">
-            <a:schemeClr val="accent1"/>
-          </a:fillRef>
-          <a:effectRef idx="1">
-            <a:schemeClr val="accent1"/>
-          </a:effectRef>
-          <a:fontRef idx="minor">
-            <a:schemeClr val="tx1"/>
-          </a:fontRef>
-        </p:style>
-      </p:cxnSp>
-      <p:sp>
-        <p:nvSpPr>
-          <p:cNvPr id="2" name="TextBox 1"/>
-          <p:cNvSpPr txBox="1"/>
-          <p:nvPr/>
-        </p:nvSpPr>
-        <p:spPr>
-          <a:xfrm>
-            <a:off x="1029298" y="3790323"/>
-            <a:ext cx="327334" cy="461665"/>
-          </a:xfrm>
-          <a:prstGeom prst="rect">
-            <a:avLst/>
-          </a:prstGeom>
-          <a:noFill/>
-        </p:spPr>
-        <p:txBody>
-          <a:bodyPr wrap="none" rtlCol="0">
-            <a:spAutoFit/>
-          </a:bodyPr>
-          <a:lstStyle/>
-          <a:p>
-            <a:r>
-              <a:rPr lang="en-US" sz="2400" b="1" dirty="0" smtClean="0"/>
-              <a:t>?</a:t>
-            </a:r>
-            <a:endParaRPr lang="en-US" sz="2400" b="1" dirty="0"/>
-          </a:p>
-        </p:txBody>
-      </p:sp>
-      <p:sp>
-        <p:nvSpPr>
-          <p:cNvPr id="22" name="TextBox 21"/>
-          <p:cNvSpPr txBox="1"/>
-          <p:nvPr/>
-        </p:nvSpPr>
-        <p:spPr>
-          <a:xfrm>
-            <a:off x="2003905" y="3790323"/>
-            <a:ext cx="327334" cy="461665"/>
-          </a:xfrm>
-          <a:prstGeom prst="rect">
-            <a:avLst/>
-          </a:prstGeom>
-          <a:noFill/>
-        </p:spPr>
-        <p:txBody>
-          <a:bodyPr wrap="none" rtlCol="0">
-            <a:spAutoFit/>
-          </a:bodyPr>
-          <a:lstStyle/>
-          <a:p>
-            <a:r>
-              <a:rPr lang="en-US" sz="2400" b="1" dirty="0" smtClean="0"/>
-              <a:t>?</a:t>
-            </a:r>
-            <a:endParaRPr lang="en-US" sz="2400" b="1" dirty="0"/>
-          </a:p>
-        </p:txBody>
-      </p:sp>
-      <p:sp>
-        <p:nvSpPr>
-          <p:cNvPr id="23" name="TextBox 22"/>
-          <p:cNvSpPr txBox="1"/>
-          <p:nvPr/>
-        </p:nvSpPr>
-        <p:spPr>
-          <a:xfrm>
-            <a:off x="2961377" y="3791800"/>
-            <a:ext cx="327334" cy="461665"/>
-          </a:xfrm>
-          <a:prstGeom prst="rect">
-            <a:avLst/>
-          </a:prstGeom>
-          <a:noFill/>
-        </p:spPr>
-        <p:txBody>
-          <a:bodyPr wrap="none" rtlCol="0">
-            <a:spAutoFit/>
-          </a:bodyPr>
-          <a:lstStyle/>
-          <a:p>
-            <a:r>
-              <a:rPr lang="en-US" sz="2400" b="1" dirty="0" smtClean="0"/>
-              <a:t>?</a:t>
-            </a:r>
-            <a:endParaRPr lang="en-US" sz="2400" b="1" dirty="0"/>
-          </a:p>
-        </p:txBody>
-      </p:sp>
-      <p:sp>
-        <p:nvSpPr>
-          <p:cNvPr id="25" name="TextBox 24"/>
-          <p:cNvSpPr txBox="1"/>
-          <p:nvPr/>
-        </p:nvSpPr>
-        <p:spPr>
-          <a:xfrm>
-            <a:off x="3925226" y="3791800"/>
-            <a:ext cx="327334" cy="461665"/>
-          </a:xfrm>
-          <a:prstGeom prst="rect">
-            <a:avLst/>
-          </a:prstGeom>
-          <a:noFill/>
-        </p:spPr>
-        <p:txBody>
-          <a:bodyPr wrap="none" rtlCol="0">
-            <a:spAutoFit/>
-          </a:bodyPr>
-          <a:lstStyle/>
-          <a:p>
-            <a:r>
-              <a:rPr lang="en-US" sz="2400" b="1" dirty="0" smtClean="0"/>
-              <a:t>?</a:t>
-            </a:r>
-            <a:endParaRPr lang="en-US" sz="2400" b="1" dirty="0"/>
-          </a:p>
-        </p:txBody>
-      </p:sp>
+      </p:pic>
     </p:spTree>
     <p:extLst>
       <p:ext uri="{BB962C8B-B14F-4D97-AF65-F5344CB8AC3E}">

</xml_diff>